<commit_message>
renamed Emotion Detector to ShireEye
</commit_message>
<xml_diff>
--- a/docs/slides/Final_Presentation_25_01.pptx
+++ b/docs/slides/Final_Presentation_25_01.pptx
@@ -9886,32 +9886,200 @@
               <a:buNone/>
             </a:pPr>
             <a:r>
-              <a:rPr lang="en-US" sz="3000" b="1"/>
-              <a:t>Leitfragen:</a:t>
-            </a:r>
-          </a:p>
-          <a:p>
-            <a:r>
-              <a:rPr lang="en-US" sz="2400"/>
-              <a:t>Wie lässt sich der Emotion Detector erfolgreich als Kaufargument vermarkten?</a:t>
-            </a:r>
-          </a:p>
-          <a:p>
-            <a:endParaRPr lang="en-US" sz="2400"/>
-          </a:p>
-          <a:p>
-            <a:r>
-              <a:rPr lang="en-US" sz="2400"/>
-              <a:t>Was für Auswirkungen hat die Einführung des Emotion Detectors auf den Absatz der Bankprodukte?</a:t>
-            </a:r>
-          </a:p>
-          <a:p>
-            <a:endParaRPr lang="en-US" sz="2400"/>
-          </a:p>
-          <a:p>
-            <a:r>
-              <a:rPr lang="en-US" sz="2400"/>
-              <a:t>Welche Zweifel hegen Zielgruppen und wie räumt man diese aus? </a:t>
+              <a:rPr lang="en-US" sz="3000" b="1" dirty="0" err="1"/>
+              <a:t>Leitfragen</a:t>
+            </a:r>
+            <a:r>
+              <a:rPr lang="en-US" sz="3000" b="1" dirty="0"/>
+              <a:t>:</a:t>
+            </a:r>
+          </a:p>
+          <a:p>
+            <a:r>
+              <a:rPr lang="en-US" sz="2400" dirty="0"/>
+              <a:t>Wie </a:t>
+            </a:r>
+            <a:r>
+              <a:rPr lang="en-US" sz="2400" dirty="0" err="1"/>
+              <a:t>lässt</a:t>
+            </a:r>
+            <a:r>
+              <a:rPr lang="en-US" sz="2400" dirty="0"/>
+              <a:t> </a:t>
+            </a:r>
+            <a:r>
+              <a:rPr lang="en-US" sz="2400" dirty="0" err="1"/>
+              <a:t>sich</a:t>
+            </a:r>
+            <a:r>
+              <a:rPr lang="en-US" sz="2400" dirty="0"/>
+              <a:t> </a:t>
+            </a:r>
+            <a:r>
+              <a:rPr lang="en-US" sz="2400" dirty="0" err="1"/>
+              <a:t>ShireEye</a:t>
+            </a:r>
+            <a:r>
+              <a:rPr lang="en-US" sz="2400" dirty="0"/>
+              <a:t> </a:t>
+            </a:r>
+            <a:r>
+              <a:rPr lang="en-US" sz="2400" dirty="0" err="1"/>
+              <a:t>erfolgreich</a:t>
+            </a:r>
+            <a:r>
+              <a:rPr lang="en-US" sz="2400" dirty="0"/>
+              <a:t> </a:t>
+            </a:r>
+            <a:r>
+              <a:rPr lang="en-US" sz="2400" dirty="0" err="1"/>
+              <a:t>als</a:t>
+            </a:r>
+            <a:r>
+              <a:rPr lang="en-US" sz="2400" dirty="0"/>
+              <a:t> </a:t>
+            </a:r>
+            <a:r>
+              <a:rPr lang="en-US" sz="2400" dirty="0" err="1"/>
+              <a:t>Kaufargument</a:t>
+            </a:r>
+            <a:r>
+              <a:rPr lang="en-US" sz="2400" dirty="0"/>
+              <a:t> </a:t>
+            </a:r>
+            <a:r>
+              <a:rPr lang="en-US" sz="2400" dirty="0" err="1"/>
+              <a:t>vermarkten</a:t>
+            </a:r>
+            <a:r>
+              <a:rPr lang="en-US" sz="2400" dirty="0"/>
+              <a:t>?</a:t>
+            </a:r>
+          </a:p>
+          <a:p>
+            <a:endParaRPr lang="en-US" sz="2400" dirty="0"/>
+          </a:p>
+          <a:p>
+            <a:r>
+              <a:rPr lang="en-US" sz="2400" dirty="0"/>
+              <a:t>Was </a:t>
+            </a:r>
+            <a:r>
+              <a:rPr lang="en-US" sz="2400" dirty="0" err="1"/>
+              <a:t>für</a:t>
+            </a:r>
+            <a:r>
+              <a:rPr lang="en-US" sz="2400" dirty="0"/>
+              <a:t> </a:t>
+            </a:r>
+            <a:r>
+              <a:rPr lang="en-US" sz="2400" dirty="0" err="1"/>
+              <a:t>Auswirkungen</a:t>
+            </a:r>
+            <a:r>
+              <a:rPr lang="en-US" sz="2400" dirty="0"/>
+              <a:t> hat die </a:t>
+            </a:r>
+            <a:r>
+              <a:rPr lang="en-US" sz="2400" dirty="0" err="1"/>
+              <a:t>Einführung</a:t>
+            </a:r>
+            <a:r>
+              <a:rPr lang="en-US" sz="2400" dirty="0"/>
+              <a:t> von </a:t>
+            </a:r>
+            <a:r>
+              <a:rPr lang="en-US" sz="2400" dirty="0" err="1"/>
+              <a:t>ShireEye</a:t>
+            </a:r>
+            <a:r>
+              <a:rPr lang="en-US" sz="2400" dirty="0"/>
+              <a:t> auf den </a:t>
+            </a:r>
+            <a:r>
+              <a:rPr lang="en-US" sz="2400" dirty="0" err="1"/>
+              <a:t>Absatz</a:t>
+            </a:r>
+            <a:r>
+              <a:rPr lang="en-US" sz="2400" dirty="0"/>
+              <a:t> der </a:t>
+            </a:r>
+            <a:r>
+              <a:rPr lang="en-US" sz="2400" dirty="0" err="1"/>
+              <a:t>Bankprodukte</a:t>
+            </a:r>
+            <a:r>
+              <a:rPr lang="en-US" sz="2400" dirty="0"/>
+              <a:t>?</a:t>
+            </a:r>
+          </a:p>
+          <a:p>
+            <a:endParaRPr lang="en-US" sz="2400" dirty="0"/>
+          </a:p>
+          <a:p>
+            <a:r>
+              <a:rPr lang="en-US" sz="2400" dirty="0" err="1"/>
+              <a:t>Welche</a:t>
+            </a:r>
+            <a:r>
+              <a:rPr lang="en-US" sz="2400" dirty="0"/>
+              <a:t> </a:t>
+            </a:r>
+            <a:r>
+              <a:rPr lang="en-US" sz="2400" dirty="0" err="1"/>
+              <a:t>Zweifel</a:t>
+            </a:r>
+            <a:r>
+              <a:rPr lang="en-US" sz="2400" dirty="0"/>
+              <a:t> </a:t>
+            </a:r>
+            <a:r>
+              <a:rPr lang="en-US" sz="2400" dirty="0" err="1"/>
+              <a:t>hegen</a:t>
+            </a:r>
+            <a:r>
+              <a:rPr lang="en-US" sz="2400" dirty="0"/>
+              <a:t> </a:t>
+            </a:r>
+            <a:r>
+              <a:rPr lang="en-US" sz="2400" dirty="0" err="1"/>
+              <a:t>Zielgruppen</a:t>
+            </a:r>
+            <a:r>
+              <a:rPr lang="en-US" sz="2400" dirty="0"/>
+              <a:t> und </a:t>
+            </a:r>
+            <a:r>
+              <a:rPr lang="en-US" sz="2400" dirty="0" err="1"/>
+              <a:t>wie</a:t>
+            </a:r>
+            <a:r>
+              <a:rPr lang="en-US" sz="2400" dirty="0"/>
+              <a:t> </a:t>
+            </a:r>
+            <a:r>
+              <a:rPr lang="en-US" sz="2400" dirty="0" err="1"/>
+              <a:t>räumt</a:t>
+            </a:r>
+            <a:r>
+              <a:rPr lang="en-US" sz="2400" dirty="0"/>
+              <a:t> man </a:t>
+            </a:r>
+            <a:r>
+              <a:rPr lang="en-US" sz="2400" dirty="0" err="1"/>
+              <a:t>diese</a:t>
+            </a:r>
+            <a:r>
+              <a:rPr lang="en-US" sz="2400" dirty="0"/>
+              <a:t> </a:t>
+            </a:r>
+            <a:r>
+              <a:rPr lang="en-US" sz="2400" dirty="0" err="1"/>
+              <a:t>aus</a:t>
+            </a:r>
+            <a:r>
+              <a:rPr lang="en-US" sz="2400" dirty="0"/>
+              <a:t>? </a:t>
             </a:r>
           </a:p>
         </p:txBody>

</xml_diff>